<commit_message>
se agrego la metodologia
</commit_message>
<xml_diff>
--- a/Entregas/SegundaEntrega/posterpoliv3 (1).pptx
+++ b/Entregas/SegundaEntrega/posterpoliv3 (1).pptx
@@ -482,7 +482,7 @@
               <a:pPr>
                 <a:defRPr/>
               </a:pPr>
-              <a:t>03/05/2018</a:t>
+              <a:t>10/05/2018</a:t>
             </a:fld>
             <a:endParaRPr lang="es-CO"/>
           </a:p>
@@ -686,7 +686,7 @@
               <a:pPr>
                 <a:defRPr/>
               </a:pPr>
-              <a:t>03/05/2018</a:t>
+              <a:t>10/05/2018</a:t>
             </a:fld>
             <a:endParaRPr lang="es-CO"/>
           </a:p>
@@ -1190,7 +1190,7 @@
               <a:pPr>
                 <a:defRPr/>
               </a:pPr>
-              <a:t>03/05/2018</a:t>
+              <a:t>10/05/2018</a:t>
             </a:fld>
             <a:endParaRPr lang="es-CO" dirty="0"/>
           </a:p>
@@ -7306,65 +7306,6 @@
       </p:sp>
       <p:sp>
         <p:nvSpPr>
-          <p:cNvPr id="14" name="Cara sonriente 13">
-            <a:extLst>
-              <a:ext uri="{FF2B5EF4-FFF2-40B4-BE49-F238E27FC236}">
-                <a16:creationId xmlns:a16="http://schemas.microsoft.com/office/drawing/2014/main" id="{350082BB-086C-4E3E-9AD6-EF1C5EE141E6}"/>
-              </a:ext>
-            </a:extLst>
-          </p:cNvPr>
-          <p:cNvSpPr/>
-          <p:nvPr/>
-        </p:nvSpPr>
-        <p:spPr>
-          <a:xfrm>
-            <a:off x="3861047" y="15103882"/>
-            <a:ext cx="3322319" cy="3322319"/>
-          </a:xfrm>
-          <a:prstGeom prst="smileyFace">
-            <a:avLst/>
-          </a:prstGeom>
-          <a:noFill/>
-          <a:ln w="57150">
-            <a:solidFill>
-              <a:schemeClr val="tx1"/>
-            </a:solidFill>
-          </a:ln>
-          <a:effectLst>
-            <a:outerShdw blurRad="50800" dist="38100" dir="18900000" algn="bl" rotWithShape="0">
-              <a:prstClr val="black">
-                <a:alpha val="40000"/>
-              </a:prstClr>
-            </a:outerShdw>
-          </a:effectLst>
-        </p:spPr>
-        <p:style>
-          <a:lnRef idx="2">
-            <a:schemeClr val="accent1">
-              <a:shade val="50000"/>
-            </a:schemeClr>
-          </a:lnRef>
-          <a:fillRef idx="1">
-            <a:schemeClr val="accent1"/>
-          </a:fillRef>
-          <a:effectRef idx="0">
-            <a:schemeClr val="accent1"/>
-          </a:effectRef>
-          <a:fontRef idx="minor">
-            <a:schemeClr val="lt1"/>
-          </a:fontRef>
-        </p:style>
-        <p:txBody>
-          <a:bodyPr rtlCol="0" anchor="ctr"/>
-          <a:lstStyle/>
-          <a:p>
-            <a:pPr algn="ctr"/>
-            <a:endParaRPr lang="es-CO"/>
-          </a:p>
-        </p:txBody>
-      </p:sp>
-      <p:sp>
-        <p:nvSpPr>
           <p:cNvPr id="15" name="Corazón 14">
             <a:extLst>
               <a:ext uri="{FF2B5EF4-FFF2-40B4-BE49-F238E27FC236}">
@@ -7527,6 +7468,65 @@
               <a:latin typeface="Arial" charset="0"/>
               <a:ea typeface="+mn-ea"/>
               <a:cs typeface="Arial" charset="0"/>
+            </a:endParaRPr>
+          </a:p>
+        </p:txBody>
+      </p:sp>
+      <p:sp>
+        <p:nvSpPr>
+          <p:cNvPr id="6" name="CuadroTexto 5"/>
+          <p:cNvSpPr txBox="1"/>
+          <p:nvPr/>
+        </p:nvSpPr>
+        <p:spPr bwMode="auto">
+          <a:xfrm>
+            <a:off x="1646237" y="14831111"/>
+            <a:ext cx="7924800" cy="4298845"/>
+          </a:xfrm>
+          <a:prstGeom prst="rect">
+            <a:avLst/>
+          </a:prstGeom>
+          <a:noFill/>
+          <a:ln w="9525">
+            <a:noFill/>
+            <a:miter lim="800000"/>
+            <a:headEnd/>
+            <a:tailEnd/>
+          </a:ln>
+        </p:spPr>
+        <p:txBody>
+          <a:bodyPr vert="horz" wrap="square" lIns="355830" tIns="177915" rIns="355830" bIns="177915" numCol="1" rtlCol="0" anchor="ctr" anchorCtr="0" compatLnSpc="1">
+            <a:prstTxWarp prst="textNoShape">
+              <a:avLst/>
+            </a:prstTxWarp>
+            <a:spAutoFit/>
+          </a:bodyPr>
+          <a:lstStyle/>
+          <a:p>
+            <a:pPr marL="0" marR="0" indent="0" defTabSz="3557588" rtl="0" eaLnBrk="1" fontAlgn="base" latinLnBrk="0" hangingPunct="1">
+              <a:lnSpc>
+                <a:spcPct val="100000"/>
+              </a:lnSpc>
+              <a:spcBef>
+                <a:spcPct val="0"/>
+              </a:spcBef>
+              <a:spcAft>
+                <a:spcPct val="0"/>
+              </a:spcAft>
+              <a:buClrTx/>
+              <a:buSzTx/>
+              <a:buFontTx/>
+              <a:buNone/>
+              <a:tabLst/>
+            </a:pPr>
+            <a:r>
+              <a:rPr lang="es-CO" sz="3200" dirty="0" smtClean="0"/>
+              <a:t>Este proyecto se trabajó mediante la metodología RUP (RATIONAL UNIFIED PROCESS)  que nos permite mejorar la productividad  del equipo. En esta metodología el flujo de trabajo de procesos se maneja mediante cuatro fases (inicio, elaboración, construcción y transición) </a:t>
+            </a:r>
+            <a:endParaRPr lang="es-CO" sz="3200" kern="1200" dirty="0" smtClean="0">
+              <a:solidFill>
+                <a:schemeClr val="tx1"/>
+              </a:solidFill>
             </a:endParaRPr>
           </a:p>
         </p:txBody>

</xml_diff>